<commit_message>
update doc and add progress counter
</commit_message>
<xml_diff>
--- a/doc/Fritz_Svetoslav_TSP.pptx
+++ b/doc/Fritz_Svetoslav_TSP.pptx
@@ -3452,15 +3452,7 @@
           <a:p>
             <a:r>
               <a:rPr lang="de-AT" dirty="0" smtClean="0"/>
-              <a:t>Lokales Optimum </a:t>
-            </a:r>
-            <a:r>
-              <a:rPr lang="de-AT" dirty="0" smtClean="0"/>
-              <a:t>der Nachbarschafft wird </a:t>
-            </a:r>
-            <a:r>
-              <a:rPr lang="de-AT" dirty="0" smtClean="0"/>
-              <a:t>mittels lokaler Suche bestimmt</a:t>
+              <a:t>Lokales Optimum der Nachbarschafft wird mittels lokaler Suche bestimmt</a:t>
             </a:r>
           </a:p>
           <a:p>
@@ -3469,13 +3461,8 @@
           <a:p>
             <a:r>
               <a:rPr lang="de-AT" dirty="0" smtClean="0"/>
-              <a:t>Globales Optimum ist bestes lokales Optimum nach </a:t>
-            </a:r>
-            <a:r>
-              <a:rPr lang="de-AT" dirty="0" smtClean="0"/>
-              <a:t>Abbruchbedingung</a:t>
-            </a:r>
-            <a:endParaRPr lang="de-AT" dirty="0" smtClean="0"/>
+              <a:t>Globales Optimum ist bestes lokales Optimum nach Abbruchbedingung</a:t>
+            </a:r>
           </a:p>
         </p:txBody>
       </p:sp>
@@ -4746,7 +4733,6 @@
               <a:rPr lang="de-AT" dirty="0" smtClean="0"/>
               <a:t>umgedreht</a:t>
             </a:r>
-            <a:endParaRPr lang="de-AT" dirty="0" smtClean="0"/>
           </a:p>
           <a:p>
             <a:r>
@@ -4775,7 +4761,6 @@
               <a:rPr lang="de-AT" dirty="0" smtClean="0"/>
               <a:t> ohne Verbesserung)</a:t>
             </a:r>
-            <a:endParaRPr lang="de-AT" dirty="0" smtClean="0"/>
           </a:p>
         </p:txBody>
       </p:sp>
@@ -5467,8 +5452,12 @@
           <a:lstStyle/>
           <a:p>
             <a:r>
-              <a:rPr lang="de-AT" dirty="0" smtClean="0"/>
-              <a:t>Abbruchbedingungen</a:t>
+              <a:rPr lang="de-AT" dirty="0" err="1" smtClean="0"/>
+              <a:t>Local</a:t>
+            </a:r>
+            <a:r>
+              <a:rPr lang="de-AT" dirty="0" smtClean="0"/>
+              <a:t> Search – 2 Varianten</a:t>
             </a:r>
             <a:endParaRPr lang="de-AT" dirty="0"/>
           </a:p>
@@ -5484,41 +5473,167 @@
             <p:ph idx="1"/>
           </p:nvPr>
         </p:nvSpPr>
-        <p:spPr/>
-        <p:txBody>
-          <a:bodyPr/>
-          <a:lstStyle/>
-          <a:p>
-            <a:r>
-              <a:rPr lang="de-AT" dirty="0" smtClean="0"/>
-              <a:t>Abbruch von ILS geschieht unabhängig von Verlauf erst nach erreichen der angegebenen Max.-Iteration</a:t>
+        <p:spPr>
+          <a:xfrm>
+            <a:off x="838200" y="1825625"/>
+            <a:ext cx="10515600" cy="4542518"/>
+          </a:xfrm>
+        </p:spPr>
+        <p:txBody>
+          <a:bodyPr>
+            <a:normAutofit fontScale="92500" lnSpcReduction="10000"/>
+          </a:bodyPr>
+          <a:lstStyle/>
+          <a:p>
+            <a:pPr marL="514350" indent="-514350">
+              <a:buFont typeface="+mj-lt"/>
+              <a:buAutoNum type="arabicPeriod"/>
+            </a:pPr>
+            <a:r>
+              <a:rPr lang="de-AT" dirty="0" smtClean="0"/>
+              <a:t>2-Opt mit allen möglichen Kanten-Kombinationen durchführen</a:t>
             </a:r>
           </a:p>
           <a:p>
             <a:pPr lvl="1"/>
             <a:r>
               <a:rPr lang="de-AT" dirty="0" smtClean="0"/>
-              <a:t>Dadurch hat User allein Einfluss, </a:t>
-            </a:r>
-            <a:r>
-              <a:rPr lang="de-AT" dirty="0" smtClean="0"/>
-              <a:t>wie lange Algorithmus läuft</a:t>
+              <a:t>Bestes Ergebnis ist lokales Optimum</a:t>
+            </a:r>
+          </a:p>
+          <a:p>
+            <a:pPr lvl="1"/>
+            <a:r>
+              <a:rPr lang="de-AT" dirty="0" smtClean="0"/>
+              <a:t>&gt; 52 Knoten: (52 </a:t>
+            </a:r>
+            <a:r>
+              <a:rPr lang="de-AT" dirty="0" smtClean="0"/>
+              <a:t>* 49) / 2 = </a:t>
+            </a:r>
+            <a:r>
+              <a:rPr lang="de-AT" dirty="0" smtClean="0"/>
+              <a:t>1 274 Kombinationen</a:t>
+            </a:r>
+          </a:p>
+          <a:p>
+            <a:pPr lvl="1"/>
+            <a:r>
+              <a:rPr lang="de-AT" dirty="0" smtClean="0"/>
+              <a:t>&gt; 150 Knoten: (150*147) / 2 = 11 025 Kombinationen</a:t>
             </a:r>
             <a:endParaRPr lang="de-AT" dirty="0" smtClean="0"/>
           </a:p>
           <a:p>
-            <a:endParaRPr lang="de-AT" dirty="0"/>
-          </a:p>
-          <a:p>
-            <a:r>
-              <a:rPr lang="de-AT" dirty="0" smtClean="0"/>
-              <a:t>Alternativer Modus: Lokale </a:t>
-            </a:r>
-            <a:r>
-              <a:rPr lang="de-AT" dirty="0" smtClean="0"/>
-              <a:t>Suche wird gestoppt falls lokales Optimum in letzten X Versuchen nicht verbessert wurde</a:t>
-            </a:r>
-            <a:endParaRPr lang="de-AT" dirty="0"/>
+            <a:pPr marL="514350" indent="-514350">
+              <a:buFont typeface="+mj-lt"/>
+              <a:buAutoNum type="arabicPeriod"/>
+            </a:pPr>
+            <a:r>
+              <a:rPr lang="de-AT" dirty="0" smtClean="0"/>
+              <a:t>2-Opt mit 2 zufällig gewählten Kanten</a:t>
+            </a:r>
+          </a:p>
+          <a:p>
+            <a:pPr lvl="1"/>
+            <a:r>
+              <a:rPr lang="de-AT" dirty="0" smtClean="0"/>
+              <a:t>Bei </a:t>
+            </a:r>
+            <a:r>
+              <a:rPr lang="de-AT" dirty="0" smtClean="0"/>
+              <a:t>Verbesserung (des globalen Optimum) </a:t>
+            </a:r>
+            <a:r>
+              <a:rPr lang="de-AT" dirty="0" smtClean="0"/>
+              <a:t>wird Veränderung übernommen und mit dieser fortgefahren</a:t>
+            </a:r>
+          </a:p>
+          <a:p>
+            <a:pPr lvl="1"/>
+            <a:r>
+              <a:rPr lang="de-AT" dirty="0" smtClean="0"/>
+              <a:t>Ein „</a:t>
+            </a:r>
+            <a:r>
+              <a:rPr lang="de-AT" dirty="0" err="1" smtClean="0"/>
+              <a:t>No-Improve</a:t>
+            </a:r>
+            <a:r>
+              <a:rPr lang="de-AT" dirty="0" smtClean="0"/>
+              <a:t>“ Parameter bestimmt, nach wie vielen </a:t>
+            </a:r>
+            <a:r>
+              <a:rPr lang="de-AT" dirty="0" err="1" smtClean="0"/>
+              <a:t>Moves</a:t>
+            </a:r>
+            <a:r>
+              <a:rPr lang="de-AT" dirty="0" smtClean="0"/>
+              <a:t> </a:t>
+            </a:r>
+            <a:r>
+              <a:rPr lang="de-AT" dirty="0" smtClean="0"/>
+              <a:t>ohne Verbesserung </a:t>
+            </a:r>
+            <a:r>
+              <a:rPr lang="de-AT" dirty="0" smtClean="0"/>
+              <a:t>die Nachbarschafft übersprungen wird</a:t>
+            </a:r>
+            <a:endParaRPr lang="de-AT" dirty="0" smtClean="0"/>
+          </a:p>
+          <a:p>
+            <a:pPr lvl="1"/>
+            <a:r>
+              <a:rPr lang="de-AT" dirty="0" smtClean="0"/>
+              <a:t>&gt; 52 Knoten mit „</a:t>
+            </a:r>
+            <a:r>
+              <a:rPr lang="de-AT" dirty="0" err="1" smtClean="0"/>
+              <a:t>No-Improve</a:t>
+            </a:r>
+            <a:r>
+              <a:rPr lang="de-AT" dirty="0" smtClean="0"/>
+              <a:t>“ Parameter P:</a:t>
+            </a:r>
+          </a:p>
+          <a:p>
+            <a:pPr lvl="2"/>
+            <a:r>
+              <a:rPr lang="de-AT" dirty="0" smtClean="0"/>
+              <a:t>P=100: </a:t>
+            </a:r>
+            <a:r>
+              <a:rPr lang="de-AT" dirty="0" smtClean="0"/>
+              <a:t>Ø 360;	P=200: Ø 800;	P=300: Ø 1235</a:t>
+            </a:r>
+          </a:p>
+          <a:p>
+            <a:pPr lvl="1"/>
+            <a:r>
+              <a:rPr lang="de-AT" dirty="0" smtClean="0"/>
+              <a:t>&gt; </a:t>
+            </a:r>
+            <a:r>
+              <a:rPr lang="de-AT" dirty="0"/>
+              <a:t>150 Knoten mit „</a:t>
+            </a:r>
+            <a:r>
+              <a:rPr lang="de-AT" dirty="0" err="1"/>
+              <a:t>No-Improve</a:t>
+            </a:r>
+            <a:r>
+              <a:rPr lang="de-AT" dirty="0"/>
+              <a:t>“ Parameter P :</a:t>
+            </a:r>
+            <a:endParaRPr lang="de-AT" dirty="0" smtClean="0"/>
+          </a:p>
+          <a:p>
+            <a:pPr lvl="2"/>
+            <a:r>
+              <a:rPr lang="de-AT" dirty="0" smtClean="0"/>
+              <a:t>P=500: Ø 2442;	P=750: Ø 4479;	P=1000: Ø 5416</a:t>
+            </a:r>
+            <a:endParaRPr lang="de-AT" dirty="0" smtClean="0"/>
           </a:p>
         </p:txBody>
       </p:sp>
@@ -5614,11 +5729,7 @@
             <a:pPr lvl="1"/>
             <a:r>
               <a:rPr lang="de-AT" dirty="0" smtClean="0"/>
-              <a:t>Graph Visualisierung</a:t>
-            </a:r>
-            <a:r>
-              <a:rPr lang="de-AT" dirty="0" smtClean="0"/>
-              <a:t>: </a:t>
+              <a:t>Graph Visualisierung: </a:t>
             </a:r>
             <a:r>
               <a:rPr lang="de-AT" dirty="0" err="1" smtClean="0"/>
@@ -5729,7 +5840,6 @@
               <a:rPr lang="de-AT" dirty="0" smtClean="0"/>
               <a:t>Modus</a:t>
             </a:r>
-            <a:endParaRPr lang="de-AT" dirty="0" smtClean="0"/>
           </a:p>
           <a:p>
             <a:pPr lvl="1"/>
@@ -5790,13 +5900,8 @@
             <a:pPr lvl="1"/>
             <a:r>
               <a:rPr lang="de-AT" dirty="0" smtClean="0"/>
-              <a:t>Graph als </a:t>
-            </a:r>
-            <a:r>
-              <a:rPr lang="de-AT" dirty="0" smtClean="0"/>
-              <a:t>PNG</a:t>
-            </a:r>
-            <a:endParaRPr lang="de-AT" dirty="0" smtClean="0"/>
+              <a:t>Graph als PNG</a:t>
+            </a:r>
           </a:p>
         </p:txBody>
       </p:sp>

</xml_diff>